<commit_message>
Mise a jour du rapport et du plan de la soutenance
</commit_message>
<xml_diff>
--- a/Soutenance/soutenance-projetco.pptx
+++ b/Soutenance/soutenance-projetco.pptx
@@ -4,6 +4,10 @@
   <p:sldMasterIdLst>
     <p:sldMasterId id="2147483648" r:id="rId1"/>
   </p:sldMasterIdLst>
+  <p:sldIdLst>
+    <p:sldId id="256" r:id="rId2"/>
+    <p:sldId id="257" r:id="rId3"/>
+  </p:sldIdLst>
   <p:sldSz cx="9144000" cy="6858000" type="screen4x3"/>
   <p:notesSz cx="6858000" cy="9144000"/>
   <p:defaultTextStyle>
@@ -285,7 +289,7 @@
           <a:p>
             <a:fld id="{AA309A6D-C09C-4548-B29A-6CF363A7E532}" type="datetimeFigureOut">
               <a:rPr lang="fr-FR" smtClean="0"/>
-              <a:t>26/09/2006</a:t>
+              <a:t>04/06/2012</a:t>
             </a:fld>
             <a:endParaRPr lang="fr-BE"/>
           </a:p>
@@ -450,7 +454,7 @@
           <a:p>
             <a:fld id="{AA309A6D-C09C-4548-B29A-6CF363A7E532}" type="datetimeFigureOut">
               <a:rPr lang="fr-FR" smtClean="0"/>
-              <a:t>26/09/2006</a:t>
+              <a:t>04/06/2012</a:t>
             </a:fld>
             <a:endParaRPr lang="fr-BE"/>
           </a:p>
@@ -625,7 +629,7 @@
           <a:p>
             <a:fld id="{AA309A6D-C09C-4548-B29A-6CF363A7E532}" type="datetimeFigureOut">
               <a:rPr lang="fr-FR" smtClean="0"/>
-              <a:t>26/09/2006</a:t>
+              <a:t>04/06/2012</a:t>
             </a:fld>
             <a:endParaRPr lang="fr-BE"/>
           </a:p>
@@ -790,7 +794,7 @@
           <a:p>
             <a:fld id="{AA309A6D-C09C-4548-B29A-6CF363A7E532}" type="datetimeFigureOut">
               <a:rPr lang="fr-FR" smtClean="0"/>
-              <a:t>26/09/2006</a:t>
+              <a:t>04/06/2012</a:t>
             </a:fld>
             <a:endParaRPr lang="fr-BE"/>
           </a:p>
@@ -1031,7 +1035,7 @@
           <a:p>
             <a:fld id="{AA309A6D-C09C-4548-B29A-6CF363A7E532}" type="datetimeFigureOut">
               <a:rPr lang="fr-FR" smtClean="0"/>
-              <a:t>26/09/2006</a:t>
+              <a:t>04/06/2012</a:t>
             </a:fld>
             <a:endParaRPr lang="fr-BE"/>
           </a:p>
@@ -1314,7 +1318,7 @@
           <a:p>
             <a:fld id="{AA309A6D-C09C-4548-B29A-6CF363A7E532}" type="datetimeFigureOut">
               <a:rPr lang="fr-FR" smtClean="0"/>
-              <a:t>26/09/2006</a:t>
+              <a:t>04/06/2012</a:t>
             </a:fld>
             <a:endParaRPr lang="fr-BE"/>
           </a:p>
@@ -1731,7 +1735,7 @@
           <a:p>
             <a:fld id="{AA309A6D-C09C-4548-B29A-6CF363A7E532}" type="datetimeFigureOut">
               <a:rPr lang="fr-FR" smtClean="0"/>
-              <a:t>26/09/2006</a:t>
+              <a:t>04/06/2012</a:t>
             </a:fld>
             <a:endParaRPr lang="fr-BE"/>
           </a:p>
@@ -1844,7 +1848,7 @@
           <a:p>
             <a:fld id="{AA309A6D-C09C-4548-B29A-6CF363A7E532}" type="datetimeFigureOut">
               <a:rPr lang="fr-FR" smtClean="0"/>
-              <a:t>26/09/2006</a:t>
+              <a:t>04/06/2012</a:t>
             </a:fld>
             <a:endParaRPr lang="fr-BE"/>
           </a:p>
@@ -1934,7 +1938,7 @@
           <a:p>
             <a:fld id="{AA309A6D-C09C-4548-B29A-6CF363A7E532}" type="datetimeFigureOut">
               <a:rPr lang="fr-FR" smtClean="0"/>
-              <a:t>26/09/2006</a:t>
+              <a:t>04/06/2012</a:t>
             </a:fld>
             <a:endParaRPr lang="fr-BE"/>
           </a:p>
@@ -2206,7 +2210,7 @@
           <a:p>
             <a:fld id="{AA309A6D-C09C-4548-B29A-6CF363A7E532}" type="datetimeFigureOut">
               <a:rPr lang="fr-FR" smtClean="0"/>
-              <a:t>26/09/2006</a:t>
+              <a:t>04/06/2012</a:t>
             </a:fld>
             <a:endParaRPr lang="fr-BE"/>
           </a:p>
@@ -2454,7 +2458,7 @@
           <a:p>
             <a:fld id="{AA309A6D-C09C-4548-B29A-6CF363A7E532}" type="datetimeFigureOut">
               <a:rPr lang="fr-FR" smtClean="0"/>
-              <a:t>26/09/2006</a:t>
+              <a:t>04/06/2012</a:t>
             </a:fld>
             <a:endParaRPr lang="fr-BE"/>
           </a:p>
@@ -2662,7 +2666,7 @@
           <a:p>
             <a:fld id="{AA309A6D-C09C-4548-B29A-6CF363A7E532}" type="datetimeFigureOut">
               <a:rPr lang="fr-FR" smtClean="0"/>
-              <a:t>26/09/2006</a:t>
+              <a:t>04/06/2012</a:t>
             </a:fld>
             <a:endParaRPr lang="fr-BE"/>
           </a:p>
@@ -3013,6 +3017,232 @@
     </p:otherStyle>
   </p:txStyles>
 </p:sldMaster>
+</file>
+
+<file path=ppt/slides/slide1.xml><?xml version="1.0" encoding="utf-8"?>
+<p:sld xmlns:a="http://schemas.openxmlformats.org/drawingml/2006/main" xmlns:r="http://schemas.openxmlformats.org/officeDocument/2006/relationships" xmlns:p="http://schemas.openxmlformats.org/presentationml/2006/main">
+  <p:cSld>
+    <p:spTree>
+      <p:nvGrpSpPr>
+        <p:cNvPr id="1" name=""/>
+        <p:cNvGrpSpPr/>
+        <p:nvPr/>
+      </p:nvGrpSpPr>
+      <p:grpSpPr>
+        <a:xfrm>
+          <a:off x="0" y="0"/>
+          <a:ext cx="0" cy="0"/>
+          <a:chOff x="0" y="0"/>
+          <a:chExt cx="0" cy="0"/>
+        </a:xfrm>
+      </p:grpSpPr>
+      <p:sp>
+        <p:nvSpPr>
+          <p:cNvPr id="2" name="Titre 1"/>
+          <p:cNvSpPr>
+            <a:spLocks noGrp="1"/>
+          </p:cNvSpPr>
+          <p:nvPr>
+            <p:ph type="ctrTitle"/>
+          </p:nvPr>
+        </p:nvSpPr>
+        <p:spPr/>
+        <p:txBody>
+          <a:bodyPr/>
+          <a:lstStyle/>
+          <a:p>
+            <a:endParaRPr lang="fr-FR"/>
+          </a:p>
+        </p:txBody>
+      </p:sp>
+      <p:sp>
+        <p:nvSpPr>
+          <p:cNvPr id="3" name="Sous-titre 2"/>
+          <p:cNvSpPr>
+            <a:spLocks noGrp="1"/>
+          </p:cNvSpPr>
+          <p:nvPr>
+            <p:ph type="subTitle" idx="1"/>
+          </p:nvPr>
+        </p:nvSpPr>
+        <p:spPr/>
+        <p:txBody>
+          <a:bodyPr/>
+          <a:lstStyle/>
+          <a:p>
+            <a:endParaRPr lang="fr-FR"/>
+          </a:p>
+        </p:txBody>
+      </p:sp>
+    </p:spTree>
+    <p:extLst>
+      <p:ext uri="{BB962C8B-B14F-4D97-AF65-F5344CB8AC3E}">
+        <p14:creationId xmlns:p14="http://schemas.microsoft.com/office/powerpoint/2010/main" val="1685930652"/>
+      </p:ext>
+    </p:extLst>
+  </p:cSld>
+  <p:clrMapOvr>
+    <a:masterClrMapping/>
+  </p:clrMapOvr>
+  <p:timing>
+    <p:tnLst>
+      <p:par>
+        <p:cTn id="1" dur="indefinite" restart="never" nodeType="tmRoot"/>
+      </p:par>
+    </p:tnLst>
+  </p:timing>
+</p:sld>
+</file>
+
+<file path=ppt/slides/slide2.xml><?xml version="1.0" encoding="utf-8"?>
+<p:sld xmlns:a="http://schemas.openxmlformats.org/drawingml/2006/main" xmlns:r="http://schemas.openxmlformats.org/officeDocument/2006/relationships" xmlns:p="http://schemas.openxmlformats.org/presentationml/2006/main">
+  <p:cSld>
+    <p:spTree>
+      <p:nvGrpSpPr>
+        <p:cNvPr id="1" name=""/>
+        <p:cNvGrpSpPr/>
+        <p:nvPr/>
+      </p:nvGrpSpPr>
+      <p:grpSpPr>
+        <a:xfrm>
+          <a:off x="0" y="0"/>
+          <a:ext cx="0" cy="0"/>
+          <a:chOff x="0" y="0"/>
+          <a:chExt cx="0" cy="0"/>
+        </a:xfrm>
+      </p:grpSpPr>
+      <p:sp>
+        <p:nvSpPr>
+          <p:cNvPr id="2" name="Titre 1"/>
+          <p:cNvSpPr>
+            <a:spLocks noGrp="1"/>
+          </p:cNvSpPr>
+          <p:nvPr>
+            <p:ph type="title"/>
+          </p:nvPr>
+        </p:nvSpPr>
+        <p:spPr/>
+        <p:txBody>
+          <a:bodyPr/>
+          <a:lstStyle/>
+          <a:p>
+            <a:r>
+              <a:rPr lang="fr-FR" dirty="0" smtClean="0"/>
+              <a:t>Plan</a:t>
+            </a:r>
+            <a:endParaRPr lang="fr-FR" dirty="0"/>
+          </a:p>
+        </p:txBody>
+      </p:sp>
+      <p:sp>
+        <p:nvSpPr>
+          <p:cNvPr id="3" name="Espace réservé du contenu 2"/>
+          <p:cNvSpPr>
+            <a:spLocks noGrp="1"/>
+          </p:cNvSpPr>
+          <p:nvPr>
+            <p:ph idx="1"/>
+          </p:nvPr>
+        </p:nvSpPr>
+        <p:spPr/>
+        <p:txBody>
+          <a:bodyPr>
+            <a:normAutofit fontScale="92500" lnSpcReduction="20000"/>
+          </a:bodyPr>
+          <a:lstStyle/>
+          <a:p>
+            <a:r>
+              <a:rPr lang="fr-FR" dirty="0" smtClean="0"/>
+              <a:t>Présentation du sujet</a:t>
+            </a:r>
+          </a:p>
+          <a:p>
+            <a:r>
+              <a:rPr lang="fr-FR" dirty="0" smtClean="0"/>
+              <a:t>Application mobile</a:t>
+            </a:r>
+          </a:p>
+          <a:p>
+            <a:pPr lvl="2"/>
+            <a:r>
+              <a:rPr lang="fr-FR" dirty="0" smtClean="0"/>
+              <a:t>Fonctionnement de l’application</a:t>
+            </a:r>
+          </a:p>
+          <a:p>
+            <a:pPr lvl="2"/>
+            <a:r>
+              <a:rPr lang="fr-FR" dirty="0" smtClean="0"/>
+              <a:t>…</a:t>
+            </a:r>
+          </a:p>
+          <a:p>
+            <a:r>
+              <a:rPr lang="fr-FR" dirty="0" smtClean="0"/>
+              <a:t>Application PC</a:t>
+            </a:r>
+          </a:p>
+          <a:p>
+            <a:pPr lvl="2"/>
+            <a:r>
+              <a:rPr lang="fr-FR" dirty="0" smtClean="0"/>
+              <a:t>Structure de l’application</a:t>
+            </a:r>
+          </a:p>
+          <a:p>
+            <a:pPr lvl="2"/>
+            <a:r>
+              <a:rPr lang="fr-FR" dirty="0" smtClean="0"/>
+              <a:t>Diagramme de classe</a:t>
+            </a:r>
+          </a:p>
+          <a:p>
+            <a:pPr lvl="2"/>
+            <a:r>
+              <a:rPr lang="fr-FR" smtClean="0"/>
+              <a:t>…</a:t>
+            </a:r>
+            <a:endParaRPr lang="fr-FR" dirty="0" smtClean="0"/>
+          </a:p>
+          <a:p>
+            <a:r>
+              <a:rPr lang="fr-FR" dirty="0" smtClean="0"/>
+              <a:t>Problèmes rencontrés</a:t>
+            </a:r>
+          </a:p>
+          <a:p>
+            <a:r>
+              <a:rPr lang="fr-FR" dirty="0" smtClean="0"/>
+              <a:t>Gestion du projet</a:t>
+            </a:r>
+          </a:p>
+          <a:p>
+            <a:r>
+              <a:rPr lang="fr-FR" dirty="0" smtClean="0"/>
+              <a:t>Conclusion</a:t>
+            </a:r>
+            <a:endParaRPr lang="fr-FR" dirty="0"/>
+          </a:p>
+        </p:txBody>
+      </p:sp>
+    </p:spTree>
+    <p:extLst>
+      <p:ext uri="{BB962C8B-B14F-4D97-AF65-F5344CB8AC3E}">
+        <p14:creationId xmlns:p14="http://schemas.microsoft.com/office/powerpoint/2010/main" val="4056296425"/>
+      </p:ext>
+    </p:extLst>
+  </p:cSld>
+  <p:clrMapOvr>
+    <a:masterClrMapping/>
+  </p:clrMapOvr>
+  <p:timing>
+    <p:tnLst>
+      <p:par>
+        <p:cTn id="1" dur="indefinite" restart="never" nodeType="tmRoot"/>
+      </p:par>
+    </p:tnLst>
+  </p:timing>
+</p:sld>
 </file>
 
 <file path=ppt/theme/theme1.xml><?xml version="1.0" encoding="utf-8"?>

</xml_diff>